<commit_message>
Simuleringsdata og feilretting i presentasjon
</commit_message>
<xml_diff>
--- a/Presentasjon/simulerings presentasjon for Servi og NOV 25.04.25.pptx
+++ b/Presentasjon/simulerings presentasjon for Servi og NOV 25.04.25.pptx
@@ -268,7 +268,7 @@
           <a:p>
             <a:fld id="{4A147EC9-BD7E-45F3-9205-F8830698FAA6}" type="datetimeFigureOut">
               <a:rPr lang="en-GB" smtClean="0"/>
-              <a:t>22/04/2025</a:t>
+              <a:t>23/04/2025</a:t>
             </a:fld>
             <a:endParaRPr lang="en-GB"/>
           </a:p>
@@ -468,7 +468,7 @@
           <a:p>
             <a:fld id="{4A147EC9-BD7E-45F3-9205-F8830698FAA6}" type="datetimeFigureOut">
               <a:rPr lang="en-GB" smtClean="0"/>
-              <a:t>22/04/2025</a:t>
+              <a:t>23/04/2025</a:t>
             </a:fld>
             <a:endParaRPr lang="en-GB"/>
           </a:p>
@@ -678,7 +678,7 @@
           <a:p>
             <a:fld id="{4A147EC9-BD7E-45F3-9205-F8830698FAA6}" type="datetimeFigureOut">
               <a:rPr lang="en-GB" smtClean="0"/>
-              <a:t>22/04/2025</a:t>
+              <a:t>23/04/2025</a:t>
             </a:fld>
             <a:endParaRPr lang="en-GB"/>
           </a:p>
@@ -878,7 +878,7 @@
           <a:p>
             <a:fld id="{4A147EC9-BD7E-45F3-9205-F8830698FAA6}" type="datetimeFigureOut">
               <a:rPr lang="en-GB" smtClean="0"/>
-              <a:t>22/04/2025</a:t>
+              <a:t>23/04/2025</a:t>
             </a:fld>
             <a:endParaRPr lang="en-GB"/>
           </a:p>
@@ -1154,7 +1154,7 @@
           <a:p>
             <a:fld id="{4A147EC9-BD7E-45F3-9205-F8830698FAA6}" type="datetimeFigureOut">
               <a:rPr lang="en-GB" smtClean="0"/>
-              <a:t>22/04/2025</a:t>
+              <a:t>23/04/2025</a:t>
             </a:fld>
             <a:endParaRPr lang="en-GB"/>
           </a:p>
@@ -1422,7 +1422,7 @@
           <a:p>
             <a:fld id="{4A147EC9-BD7E-45F3-9205-F8830698FAA6}" type="datetimeFigureOut">
               <a:rPr lang="en-GB" smtClean="0"/>
-              <a:t>22/04/2025</a:t>
+              <a:t>23/04/2025</a:t>
             </a:fld>
             <a:endParaRPr lang="en-GB"/>
           </a:p>
@@ -1837,7 +1837,7 @@
           <a:p>
             <a:fld id="{4A147EC9-BD7E-45F3-9205-F8830698FAA6}" type="datetimeFigureOut">
               <a:rPr lang="en-GB" smtClean="0"/>
-              <a:t>22/04/2025</a:t>
+              <a:t>23/04/2025</a:t>
             </a:fld>
             <a:endParaRPr lang="en-GB"/>
           </a:p>
@@ -1979,7 +1979,7 @@
           <a:p>
             <a:fld id="{4A147EC9-BD7E-45F3-9205-F8830698FAA6}" type="datetimeFigureOut">
               <a:rPr lang="en-GB" smtClean="0"/>
-              <a:t>22/04/2025</a:t>
+              <a:t>23/04/2025</a:t>
             </a:fld>
             <a:endParaRPr lang="en-GB"/>
           </a:p>
@@ -2092,7 +2092,7 @@
           <a:p>
             <a:fld id="{4A147EC9-BD7E-45F3-9205-F8830698FAA6}" type="datetimeFigureOut">
               <a:rPr lang="en-GB" smtClean="0"/>
-              <a:t>22/04/2025</a:t>
+              <a:t>23/04/2025</a:t>
             </a:fld>
             <a:endParaRPr lang="en-GB"/>
           </a:p>
@@ -2405,7 +2405,7 @@
           <a:p>
             <a:fld id="{4A147EC9-BD7E-45F3-9205-F8830698FAA6}" type="datetimeFigureOut">
               <a:rPr lang="en-GB" smtClean="0"/>
-              <a:t>22/04/2025</a:t>
+              <a:t>23/04/2025</a:t>
             </a:fld>
             <a:endParaRPr lang="en-GB"/>
           </a:p>
@@ -2694,7 +2694,7 @@
           <a:p>
             <a:fld id="{4A147EC9-BD7E-45F3-9205-F8830698FAA6}" type="datetimeFigureOut">
               <a:rPr lang="en-GB" smtClean="0"/>
-              <a:t>22/04/2025</a:t>
+              <a:t>23/04/2025</a:t>
             </a:fld>
             <a:endParaRPr lang="en-GB"/>
           </a:p>
@@ -2937,7 +2937,7 @@
           <a:p>
             <a:fld id="{4A147EC9-BD7E-45F3-9205-F8830698FAA6}" type="datetimeFigureOut">
               <a:rPr lang="en-GB" smtClean="0"/>
-              <a:t>22/04/2025</a:t>
+              <a:t>23/04/2025</a:t>
             </a:fld>
             <a:endParaRPr lang="en-GB"/>
           </a:p>
@@ -3470,8 +3470,12 @@
           <a:lstStyle/>
           <a:p>
             <a:r>
+              <a:rPr lang="nb-NO" dirty="0" err="1"/>
+              <a:t>Jib</a:t>
+            </a:r>
+            <a:r>
               <a:rPr lang="nb-NO" dirty="0"/>
-              <a:t>Jib kjøringn alene</a:t>
+              <a:t> kjøring alene</a:t>
             </a:r>
             <a:endParaRPr lang="en-GB" dirty="0"/>
           </a:p>
@@ -3561,7 +3565,7 @@
           <a:p>
             <a:r>
               <a:rPr lang="nb-NO" dirty="0"/>
-              <a:t>Main kjøringn alene</a:t>
+              <a:t>Main kjøring alene</a:t>
             </a:r>
             <a:endParaRPr lang="en-GB" dirty="0"/>
           </a:p>
@@ -3645,7 +3649,7 @@
           <a:p>
             <a:r>
               <a:rPr lang="nb-NO" dirty="0"/>
-              <a:t>Doblet kjøring 1</a:t>
+              <a:t>Flerakset kjøring 1</a:t>
             </a:r>
             <a:endParaRPr lang="en-GB" dirty="0"/>
           </a:p>
@@ -3735,7 +3739,7 @@
           <a:p>
             <a:r>
               <a:rPr lang="nb-NO" dirty="0"/>
-              <a:t>Doblet kjøring 2</a:t>
+              <a:t>Flerakset kjøring 2</a:t>
             </a:r>
             <a:endParaRPr lang="en-GB" dirty="0"/>
           </a:p>

</xml_diff>